<commit_message>
correction error in week 6 slide
</commit_message>
<xml_diff>
--- a/Slides/Week 06 System Modeling.pptx
+++ b/Slides/Week 06 System Modeling.pptx
@@ -5,10 +5,10 @@
     <p:sldMasterId id="2147483672" r:id="rId1"/>
   </p:sldMasterIdLst>
   <p:notesMasterIdLst>
-    <p:notesMasterId r:id="rId61"/>
+    <p:notesMasterId r:id="rId60"/>
   </p:notesMasterIdLst>
   <p:handoutMasterIdLst>
-    <p:handoutMasterId r:id="rId62"/>
+    <p:handoutMasterId r:id="rId61"/>
   </p:handoutMasterIdLst>
   <p:sldIdLst>
     <p:sldId id="256" r:id="rId2"/>
@@ -66,10 +66,9 @@
     <p:sldId id="338" r:id="rId54"/>
     <p:sldId id="339" r:id="rId55"/>
     <p:sldId id="340" r:id="rId56"/>
-    <p:sldId id="343" r:id="rId57"/>
-    <p:sldId id="344" r:id="rId58"/>
-    <p:sldId id="341" r:id="rId59"/>
-    <p:sldId id="287" r:id="rId60"/>
+    <p:sldId id="344" r:id="rId57"/>
+    <p:sldId id="341" r:id="rId58"/>
+    <p:sldId id="287" r:id="rId59"/>
   </p:sldIdLst>
   <p:sldSz cx="12192000" cy="6858000"/>
   <p:notesSz cx="6858000" cy="9144000"/>
@@ -236,7 +235,7 @@
           <a:p>
             <a:fld id="{0FEC1AAB-5E7C-43B3-93F1-3B00C2708E32}" type="datetimeFigureOut">
               <a:rPr lang="th-TH" smtClean="0"/>
-              <a:t>17/09/61</a:t>
+              <a:t>20/09/62</a:t>
             </a:fld>
             <a:endParaRPr lang="th-TH"/>
           </a:p>
@@ -414,7 +413,7 @@
           <a:p>
             <a:fld id="{5B1B5456-0566-42F4-BCC8-DF5300E15663}" type="datetimeFigureOut">
               <a:rPr lang="th-TH" smtClean="0"/>
-              <a:t>17/09/61</a:t>
+              <a:t>20/09/62</a:t>
             </a:fld>
             <a:endParaRPr lang="th-TH"/>
           </a:p>
@@ -1456,7 +1455,7 @@
           <a:p>
             <a:r>
               <a:rPr lang="th-TH"/>
-              <a:t>2561.09.18</a:t>
+              <a:t>2562.09.20</a:t>
             </a:r>
           </a:p>
         </p:txBody>
@@ -1629,7 +1628,7 @@
           <a:p>
             <a:r>
               <a:rPr lang="th-TH"/>
-              <a:t>2561.09.18</a:t>
+              <a:t>2562.09.20</a:t>
             </a:r>
           </a:p>
         </p:txBody>
@@ -1812,7 +1811,7 @@
           <a:p>
             <a:r>
               <a:rPr lang="th-TH"/>
-              <a:t>2561.09.18</a:t>
+              <a:t>2562.09.20</a:t>
             </a:r>
           </a:p>
         </p:txBody>
@@ -2050,7 +2049,7 @@
           <a:p>
             <a:r>
               <a:rPr lang="th-TH"/>
-              <a:t>2561.09.18</a:t>
+              <a:t>2562.09.20</a:t>
             </a:r>
             <a:endParaRPr lang="th-TH" dirty="0"/>
           </a:p>
@@ -2321,7 +2320,7 @@
           <a:p>
             <a:r>
               <a:rPr lang="th-TH"/>
-              <a:t>2561.09.18</a:t>
+              <a:t>2562.09.20</a:t>
             </a:r>
           </a:p>
         </p:txBody>
@@ -2562,7 +2561,7 @@
           <a:p>
             <a:r>
               <a:rPr lang="th-TH"/>
-              <a:t>2561.09.18</a:t>
+              <a:t>2562.09.20</a:t>
             </a:r>
           </a:p>
         </p:txBody>
@@ -2932,7 +2931,7 @@
           <a:p>
             <a:r>
               <a:rPr lang="th-TH"/>
-              <a:t>2561.09.18</a:t>
+              <a:t>2562.09.20</a:t>
             </a:r>
           </a:p>
         </p:txBody>
@@ -3058,7 +3057,7 @@
           <a:p>
             <a:r>
               <a:rPr lang="th-TH"/>
-              <a:t>2561.09.18</a:t>
+              <a:t>2562.09.20</a:t>
             </a:r>
           </a:p>
         </p:txBody>
@@ -3156,7 +3155,7 @@
           <a:p>
             <a:r>
               <a:rPr lang="th-TH"/>
-              <a:t>2561.09.18</a:t>
+              <a:t>2562.09.20</a:t>
             </a:r>
           </a:p>
         </p:txBody>
@@ -3436,7 +3435,7 @@
           <a:p>
             <a:r>
               <a:rPr lang="th-TH"/>
-              <a:t>2561.09.18</a:t>
+              <a:t>2562.09.20</a:t>
             </a:r>
           </a:p>
         </p:txBody>
@@ -3696,7 +3695,7 @@
           <a:p>
             <a:r>
               <a:rPr lang="th-TH"/>
-              <a:t>2561.09.18</a:t>
+              <a:t>2562.09.20</a:t>
             </a:r>
           </a:p>
         </p:txBody>
@@ -3912,7 +3911,7 @@
           <a:p>
             <a:r>
               <a:rPr lang="th-TH"/>
-              <a:t>2561.09.18</a:t>
+              <a:t>2562.09.20</a:t>
             </a:r>
           </a:p>
         </p:txBody>
@@ -4738,7 +4737,7 @@
           <a:p>
             <a:r>
               <a:rPr lang="th-TH"/>
-              <a:t>2561.09.18</a:t>
+              <a:t>2562.09.20</a:t>
             </a:r>
             <a:endParaRPr lang="th-TH" dirty="0"/>
           </a:p>
@@ -4935,7 +4934,7 @@
           <a:p>
             <a:r>
               <a:rPr lang="th-TH"/>
-              <a:t>2561.09.18</a:t>
+              <a:t>2562.09.20</a:t>
             </a:r>
             <a:endParaRPr lang="th-TH" dirty="0"/>
           </a:p>
@@ -5203,7 +5202,7 @@
           <a:p>
             <a:r>
               <a:rPr lang="th-TH"/>
-              <a:t>2561.09.18</a:t>
+              <a:t>2562.09.20</a:t>
             </a:r>
             <a:endParaRPr lang="th-TH" dirty="0"/>
           </a:p>
@@ -5368,7 +5367,7 @@
           <a:p>
             <a:r>
               <a:rPr lang="th-TH"/>
-              <a:t>2561.09.18</a:t>
+              <a:t>2562.09.20</a:t>
             </a:r>
             <a:endParaRPr lang="th-TH" dirty="0"/>
           </a:p>
@@ -5619,7 +5618,7 @@
           <a:p>
             <a:r>
               <a:rPr lang="th-TH"/>
-              <a:t>2561.09.18</a:t>
+              <a:t>2562.09.20</a:t>
             </a:r>
             <a:endParaRPr lang="th-TH" dirty="0"/>
           </a:p>
@@ -5885,7 +5884,7 @@
           <a:p>
             <a:r>
               <a:rPr lang="th-TH"/>
-              <a:t>2561.09.18</a:t>
+              <a:t>2562.09.20</a:t>
             </a:r>
             <a:endParaRPr lang="th-TH" dirty="0"/>
           </a:p>
@@ -6162,7 +6161,7 @@
                   <a:srgbClr val="3366FF"/>
                 </a:solidFill>
               </a:rPr>
-              <a:t>งานอาจเป็นบุคคลหรือระบบอื่น ๆ</a:t>
+              <a:t>อาจเป็นบุคคลหรือระบบอื่น ๆ</a:t>
             </a:r>
             <a:r>
               <a:rPr lang="en-US" dirty="0">
@@ -6233,7 +6232,7 @@
           <a:p>
             <a:r>
               <a:rPr lang="th-TH"/>
-              <a:t>2561.09.18</a:t>
+              <a:t>2562.09.20</a:t>
             </a:r>
             <a:endParaRPr lang="th-TH" dirty="0"/>
           </a:p>
@@ -6404,7 +6403,7 @@
           <a:p>
             <a:r>
               <a:rPr lang="th-TH"/>
-              <a:t>2561.09.18</a:t>
+              <a:t>2562.09.20</a:t>
             </a:r>
             <a:endParaRPr lang="th-TH" dirty="0"/>
           </a:p>
@@ -6604,7 +6603,7 @@
           <a:p>
             <a:r>
               <a:rPr lang="th-TH"/>
-              <a:t>2561.09.18</a:t>
+              <a:t>2562.09.20</a:t>
             </a:r>
             <a:endParaRPr lang="th-TH" dirty="0"/>
           </a:p>
@@ -8063,7 +8062,7 @@
           <a:p>
             <a:r>
               <a:rPr lang="th-TH"/>
-              <a:t>2561.09.18</a:t>
+              <a:t>2562.09.20</a:t>
             </a:r>
             <a:endParaRPr lang="th-TH" dirty="0"/>
           </a:p>
@@ -8294,7 +8293,7 @@
           <a:p>
             <a:r>
               <a:rPr lang="th-TH"/>
-              <a:t>2561.09.18</a:t>
+              <a:t>2562.09.20</a:t>
             </a:r>
             <a:endParaRPr lang="th-TH" dirty="0"/>
           </a:p>
@@ -8628,7 +8627,7 @@
           <a:p>
             <a:r>
               <a:rPr lang="th-TH"/>
-              <a:t>2561.09.18</a:t>
+              <a:t>2562.09.20</a:t>
             </a:r>
             <a:endParaRPr lang="th-TH" dirty="0"/>
           </a:p>
@@ -8822,7 +8821,7 @@
           <a:p>
             <a:r>
               <a:rPr lang="th-TH"/>
-              <a:t>2561.09.18</a:t>
+              <a:t>2562.09.20</a:t>
             </a:r>
             <a:endParaRPr lang="th-TH" dirty="0"/>
           </a:p>
@@ -8940,7 +8939,7 @@
           <a:p>
             <a:r>
               <a:rPr lang="th-TH"/>
-              <a:t>2561.09.18</a:t>
+              <a:t>2562.09.20</a:t>
             </a:r>
             <a:endParaRPr lang="th-TH" dirty="0"/>
           </a:p>
@@ -9231,7 +9230,7 @@
                 <a:latin typeface="TH Baijam" panose="02000506000000020004" pitchFamily="2" charset="-34"/>
                 <a:cs typeface="TH Baijam" panose="02000506000000020004" pitchFamily="2" charset="-34"/>
               </a:rPr>
-              <a:t>2561.09.18</a:t>
+              <a:t>2562.09.20</a:t>
             </a:r>
             <a:endParaRPr lang="th-TH" sz="1800" b="1" dirty="0">
               <a:solidFill>
@@ -9647,7 +9646,7 @@
           <a:p>
             <a:r>
               <a:rPr lang="th-TH"/>
-              <a:t>2561.09.18</a:t>
+              <a:t>2562.09.20</a:t>
             </a:r>
             <a:endParaRPr lang="th-TH" dirty="0"/>
           </a:p>
@@ -9913,7 +9912,7 @@
           <a:p>
             <a:r>
               <a:rPr lang="th-TH"/>
-              <a:t>2561.09.18</a:t>
+              <a:t>2562.09.20</a:t>
             </a:r>
             <a:endParaRPr lang="th-TH" dirty="0"/>
           </a:p>
@@ -10068,7 +10067,7 @@
           <a:p>
             <a:r>
               <a:rPr lang="th-TH"/>
-              <a:t>2561.09.18</a:t>
+              <a:t>2562.09.20</a:t>
             </a:r>
             <a:endParaRPr lang="th-TH" dirty="0"/>
           </a:p>
@@ -10294,7 +10293,7 @@
           <a:p>
             <a:r>
               <a:rPr lang="th-TH"/>
-              <a:t>2561.09.18</a:t>
+              <a:t>2562.09.20</a:t>
             </a:r>
             <a:endParaRPr lang="th-TH" dirty="0"/>
           </a:p>
@@ -10481,7 +10480,7 @@
           <a:p>
             <a:r>
               <a:rPr lang="th-TH"/>
-              <a:t>2561.09.18</a:t>
+              <a:t>2562.09.20</a:t>
             </a:r>
             <a:endParaRPr lang="th-TH" dirty="0"/>
           </a:p>
@@ -10720,7 +10719,7 @@
           <a:p>
             <a:r>
               <a:rPr lang="th-TH"/>
-              <a:t>2561.09.18</a:t>
+              <a:t>2562.09.20</a:t>
             </a:r>
             <a:endParaRPr lang="th-TH" dirty="0"/>
           </a:p>
@@ -10970,7 +10969,7 @@
           <a:p>
             <a:r>
               <a:rPr lang="th-TH"/>
-              <a:t>2561.09.18</a:t>
+              <a:t>2562.09.20</a:t>
             </a:r>
             <a:endParaRPr lang="th-TH" dirty="0"/>
           </a:p>
@@ -11315,7 +11314,7 @@
           <a:p>
             <a:r>
               <a:rPr lang="th-TH"/>
-              <a:t>2561.09.18</a:t>
+              <a:t>2562.09.20</a:t>
             </a:r>
             <a:endParaRPr lang="th-TH" dirty="0"/>
           </a:p>
@@ -11502,7 +11501,7 @@
           <a:p>
             <a:r>
               <a:rPr lang="th-TH"/>
-              <a:t>2561.09.18</a:t>
+              <a:t>2562.09.20</a:t>
             </a:r>
             <a:endParaRPr lang="th-TH" dirty="0"/>
           </a:p>
@@ -11691,7 +11690,7 @@
           <a:p>
             <a:r>
               <a:rPr lang="th-TH"/>
-              <a:t>2561.09.18</a:t>
+              <a:t>2562.09.20</a:t>
             </a:r>
             <a:endParaRPr lang="th-TH" dirty="0"/>
           </a:p>
@@ -11937,7 +11936,7 @@
           <a:p>
             <a:r>
               <a:rPr lang="th-TH"/>
-              <a:t>2561.09.18</a:t>
+              <a:t>2562.09.20</a:t>
             </a:r>
             <a:endParaRPr lang="th-TH" dirty="0"/>
           </a:p>
@@ -12124,7 +12123,7 @@
           <a:p>
             <a:r>
               <a:rPr lang="th-TH"/>
-              <a:t>2561.09.18</a:t>
+              <a:t>2562.09.20</a:t>
             </a:r>
             <a:endParaRPr lang="th-TH" dirty="0"/>
           </a:p>
@@ -12331,7 +12330,7 @@
                 <a:latin typeface="TH Baijam" panose="02000506000000020004" pitchFamily="2" charset="-34"/>
                 <a:cs typeface="TH Baijam" panose="02000506000000020004" pitchFamily="2" charset="-34"/>
               </a:rPr>
-              <a:t>2561.09.18</a:t>
+              <a:t>2562.09.20</a:t>
             </a:r>
             <a:endParaRPr lang="th-TH" sz="1800" b="1" dirty="0">
               <a:solidFill>
@@ -12685,7 +12684,7 @@
           <a:p>
             <a:r>
               <a:rPr lang="th-TH"/>
-              <a:t>2561.09.18</a:t>
+              <a:t>2562.09.20</a:t>
             </a:r>
             <a:endParaRPr lang="th-TH" dirty="0"/>
           </a:p>
@@ -12991,7 +12990,7 @@
           <a:p>
             <a:r>
               <a:rPr lang="th-TH"/>
-              <a:t>2561.09.18</a:t>
+              <a:t>2562.09.20</a:t>
             </a:r>
             <a:endParaRPr lang="th-TH" dirty="0"/>
           </a:p>
@@ -13180,7 +13179,7 @@
           <a:p>
             <a:r>
               <a:rPr lang="th-TH"/>
-              <a:t>2561.09.18</a:t>
+              <a:t>2562.09.20</a:t>
             </a:r>
             <a:endParaRPr lang="th-TH" dirty="0"/>
           </a:p>
@@ -13367,7 +13366,7 @@
           <a:p>
             <a:r>
               <a:rPr lang="th-TH"/>
-              <a:t>2561.09.18</a:t>
+              <a:t>2562.09.20</a:t>
             </a:r>
             <a:endParaRPr lang="th-TH" dirty="0"/>
           </a:p>
@@ -13765,7 +13764,7 @@
           <a:p>
             <a:r>
               <a:rPr lang="th-TH"/>
-              <a:t>2561.09.18</a:t>
+              <a:t>2562.09.20</a:t>
             </a:r>
             <a:endParaRPr lang="th-TH" dirty="0"/>
           </a:p>
@@ -14123,7 +14122,7 @@
           <a:p>
             <a:r>
               <a:rPr lang="th-TH"/>
-              <a:t>2561.09.18</a:t>
+              <a:t>2562.09.20</a:t>
             </a:r>
             <a:endParaRPr lang="th-TH" dirty="0"/>
           </a:p>
@@ -14519,7 +14518,7 @@
           <a:p>
             <a:r>
               <a:rPr lang="th-TH"/>
-              <a:t>2561.09.18</a:t>
+              <a:t>2562.09.20</a:t>
             </a:r>
             <a:endParaRPr lang="th-TH" dirty="0"/>
           </a:p>
@@ -14713,7 +14712,7 @@
           <a:p>
             <a:r>
               <a:rPr lang="th-TH"/>
-              <a:t>2561.09.18</a:t>
+              <a:t>2562.09.20</a:t>
             </a:r>
             <a:endParaRPr lang="th-TH" dirty="0"/>
           </a:p>
@@ -14900,7 +14899,7 @@
           <a:p>
             <a:r>
               <a:rPr lang="th-TH"/>
-              <a:t>2561.09.18</a:t>
+              <a:t>2562.09.20</a:t>
             </a:r>
             <a:endParaRPr lang="th-TH" dirty="0"/>
           </a:p>
@@ -15094,7 +15093,7 @@
           <a:p>
             <a:r>
               <a:rPr lang="th-TH"/>
-              <a:t>2561.09.18</a:t>
+              <a:t>2562.09.20</a:t>
             </a:r>
             <a:endParaRPr lang="th-TH" dirty="0"/>
           </a:p>
@@ -16720,7 +16719,7 @@
           <a:p>
             <a:r>
               <a:rPr lang="th-TH"/>
-              <a:t>2561.09.18</a:t>
+              <a:t>2562.09.20</a:t>
             </a:r>
             <a:endParaRPr lang="th-TH" dirty="0"/>
           </a:p>
@@ -18569,7 +18568,7 @@
                 <a:latin typeface="TH Baijam" panose="02000506000000020004" pitchFamily="2" charset="-34"/>
                 <a:cs typeface="TH Baijam" panose="02000506000000020004" pitchFamily="2" charset="-34"/>
               </a:rPr>
-              <a:t>2561.09.18</a:t>
+              <a:t>2562.09.20</a:t>
             </a:r>
             <a:endParaRPr lang="th-TH" sz="1800" b="1" dirty="0">
               <a:solidFill>
@@ -18761,15 +18760,7 @@
                   <a:srgbClr val="3366FF"/>
                 </a:solidFill>
               </a:rPr>
-              <a:t>วิศวกรรม</a:t>
-            </a:r>
-            <a:r>
-              <a:rPr lang="th-TH">
-                <a:solidFill>
-                  <a:srgbClr val="3366FF"/>
-                </a:solidFill>
-              </a:rPr>
-              <a:t>แบบจำลอง (</a:t>
+              <a:t>วิศวกรรมแบบจำลอง (</a:t>
             </a:r>
             <a:r>
               <a:rPr lang="en-US" dirty="0">
@@ -18777,7 +18768,7 @@
                   <a:srgbClr val="3366FF"/>
                 </a:solidFill>
               </a:rPr>
-              <a:t>MDE) </a:t>
+              <a:t>Model Driven Engineering : MDE) </a:t>
             </a:r>
             <a:r>
               <a:rPr lang="th-TH" dirty="0">
@@ -18796,15 +18787,7 @@
                   <a:srgbClr val="3366FF"/>
                 </a:solidFill>
               </a:rPr>
-              <a:t>โปรแกรมที่รัน</a:t>
-            </a:r>
-            <a:r>
-              <a:rPr lang="th-TH">
-                <a:solidFill>
-                  <a:srgbClr val="3366FF"/>
-                </a:solidFill>
-              </a:rPr>
-              <a:t>บน </a:t>
+              <a:t>โปรแกรมที่รันบน </a:t>
             </a:r>
             <a:r>
               <a:rPr lang="en-US" dirty="0">
@@ -18812,15 +18795,26 @@
                   <a:srgbClr val="3366FF"/>
                 </a:solidFill>
               </a:rPr>
-              <a:t>hardware/</a:t>
-            </a:r>
-            <a:r>
-              <a:rPr lang="en-US">
-                <a:solidFill>
-                  <a:srgbClr val="3366FF"/>
-                </a:solidFill>
-              </a:rPr>
-              <a:t>software </a:t>
+              <a:t>hardware/software platform</a:t>
+            </a:r>
+            <a:r>
+              <a:rPr lang="th-TH" dirty="0">
+                <a:solidFill>
+                  <a:srgbClr val="3366FF"/>
+                </a:solidFill>
+              </a:rPr>
+              <a:t> จะถูกสร้างขึ้นโดยอัตโนมัติจากโมเดล</a:t>
+            </a:r>
+          </a:p>
+          <a:p>
+            <a:pPr marL="512763" indent="-512763"/>
+            <a:r>
+              <a:rPr lang="th-TH" dirty="0">
+                <a:solidFill>
+                  <a:srgbClr val="3366FF"/>
+                </a:solidFill>
+              </a:rPr>
+              <a:t>ผู้คิดค้น </a:t>
             </a:r>
             <a:r>
               <a:rPr lang="en-US" dirty="0">
@@ -18828,41 +18822,6 @@
                   <a:srgbClr val="3366FF"/>
                 </a:solidFill>
               </a:rPr>
-              <a:t>platform</a:t>
-            </a:r>
-            <a:r>
-              <a:rPr lang="th-TH" dirty="0">
-                <a:solidFill>
-                  <a:srgbClr val="3366FF"/>
-                </a:solidFill>
-              </a:rPr>
-              <a:t> จะถูกสร้างขึ้นโดยอัตโนมัติจากโมเดล</a:t>
-            </a:r>
-          </a:p>
-          <a:p>
-            <a:pPr marL="512763" indent="-512763"/>
-            <a:r>
-              <a:rPr lang="th-TH" dirty="0">
-                <a:solidFill>
-                  <a:srgbClr val="3366FF"/>
-                </a:solidFill>
-              </a:rPr>
-              <a:t>ผู้</a:t>
-            </a:r>
-            <a:r>
-              <a:rPr lang="th-TH">
-                <a:solidFill>
-                  <a:srgbClr val="3366FF"/>
-                </a:solidFill>
-              </a:rPr>
-              <a:t>คิดค้น </a:t>
-            </a:r>
-            <a:r>
-              <a:rPr lang="en-US" dirty="0">
-                <a:solidFill>
-                  <a:srgbClr val="3366FF"/>
-                </a:solidFill>
-              </a:rPr>
               <a:t>MDE </a:t>
             </a:r>
             <a:r>
@@ -18910,7 +18869,7 @@
           <a:p>
             <a:r>
               <a:rPr lang="th-TH"/>
-              <a:t>2561.09.18</a:t>
+              <a:t>2562.09.20</a:t>
             </a:r>
             <a:endParaRPr lang="th-TH" dirty="0"/>
           </a:p>
@@ -19219,7 +19178,7 @@
           <a:p>
             <a:r>
               <a:rPr lang="th-TH"/>
-              <a:t>2561.09.18</a:t>
+              <a:t>2562.09.20</a:t>
             </a:r>
             <a:endParaRPr lang="th-TH" dirty="0"/>
           </a:p>
@@ -19562,7 +19521,7 @@
           <a:p>
             <a:r>
               <a:rPr lang="th-TH"/>
-              <a:t>2561.09.18</a:t>
+              <a:t>2562.09.20</a:t>
             </a:r>
             <a:endParaRPr lang="th-TH" dirty="0"/>
           </a:p>
@@ -19972,7 +19931,7 @@
           <a:p>
             <a:r>
               <a:rPr lang="th-TH"/>
-              <a:t>2561.09.18</a:t>
+              <a:t>2562.09.20</a:t>
             </a:r>
             <a:endParaRPr lang="th-TH" dirty="0"/>
           </a:p>
@@ -20206,7 +20165,77 @@
                   <a:srgbClr val="3366FF"/>
                 </a:solidFill>
               </a:rPr>
-              <a:t>ที่แสดงโครงสร้าง</a:t>
+              <a:t>ที่แสดงโครงสร้างสถิต</a:t>
+            </a:r>
+            <a:r>
+              <a:rPr lang="en-US" dirty="0">
+                <a:solidFill>
+                  <a:srgbClr val="3366FF"/>
+                </a:solidFill>
+              </a:rPr>
+              <a:t> (static) </a:t>
+            </a:r>
+            <a:r>
+              <a:rPr lang="th-TH" dirty="0">
+                <a:solidFill>
+                  <a:srgbClr val="3366FF"/>
+                </a:solidFill>
+              </a:rPr>
+              <a:t>และอธิบายวิธีตอบสนองต่อเหตุการณ์ภายนอกและภายใน</a:t>
+            </a:r>
+          </a:p>
+          <a:p>
+            <a:pPr marL="512763" indent="-512763"/>
+            <a:r>
+              <a:rPr lang="en-US" dirty="0">
+                <a:solidFill>
+                  <a:srgbClr val="3366FF"/>
+                </a:solidFill>
+              </a:rPr>
+              <a:t>Platform specific models (PSM) </a:t>
+            </a:r>
+          </a:p>
+          <a:p>
+            <a:pPr marL="969963" lvl="1" indent="-512763"/>
+            <a:r>
+              <a:rPr lang="th-TH" dirty="0">
+                <a:solidFill>
+                  <a:srgbClr val="3366FF"/>
+                </a:solidFill>
+              </a:rPr>
+              <a:t>เป็นการดัดแปลงแบบจำลอง </a:t>
+            </a:r>
+            <a:r>
+              <a:rPr lang="en-US" dirty="0">
+                <a:solidFill>
+                  <a:srgbClr val="3366FF"/>
+                </a:solidFill>
+              </a:rPr>
+              <a:t>PIM </a:t>
+            </a:r>
+            <a:r>
+              <a:rPr lang="th-TH" dirty="0">
+                <a:solidFill>
+                  <a:srgbClr val="3366FF"/>
+                </a:solidFill>
+              </a:rPr>
+              <a:t>โดยมี </a:t>
+            </a:r>
+            <a:r>
+              <a:rPr lang="en-US" dirty="0">
+                <a:solidFill>
+                  <a:srgbClr val="3366FF"/>
+                </a:solidFill>
+              </a:rPr>
+              <a:t>PSM </a:t>
+            </a:r>
+            <a:r>
+              <a:rPr lang="th-TH" dirty="0">
+                <a:solidFill>
+                  <a:srgbClr val="3366FF"/>
+                </a:solidFill>
+              </a:rPr>
+              <a:t>อิสระสำหรับแต่ละแพลตฟอร์มแอ</a:t>
             </a:r>
             <a:r>
               <a:rPr lang="th-TH" dirty="0" err="1">
@@ -20214,60 +20243,49 @@
                   <a:srgbClr val="3366FF"/>
                 </a:solidFill>
               </a:rPr>
-              <a:t>สถิตย์</a:t>
-            </a:r>
-            <a:r>
-              <a:rPr lang="th-TH" dirty="0">
-                <a:solidFill>
-                  <a:srgbClr val="3366FF"/>
-                </a:solidFill>
-              </a:rPr>
-              <a:t>และอธิบายวิธีตอบสนองต่อเหตุการณ์ภายนอกและภายใน</a:t>
-            </a:r>
-          </a:p>
-          <a:p>
-            <a:pPr marL="512763" indent="-512763"/>
+              <a:t>็พ</a:t>
+            </a:r>
+            <a:r>
+              <a:rPr lang="th-TH" dirty="0">
+                <a:solidFill>
+                  <a:srgbClr val="3366FF"/>
+                </a:solidFill>
+              </a:rPr>
+              <a:t>พลิ</a:t>
+            </a:r>
+            <a:r>
+              <a:rPr lang="th-TH" dirty="0" err="1">
+                <a:solidFill>
+                  <a:srgbClr val="3366FF"/>
+                </a:solidFill>
+              </a:rPr>
+              <a:t>เค</a:t>
+            </a:r>
+            <a:r>
+              <a:rPr lang="th-TH" dirty="0">
+                <a:solidFill>
+                  <a:srgbClr val="3366FF"/>
+                </a:solidFill>
+              </a:rPr>
+              <a:t>ชัน </a:t>
+            </a:r>
+          </a:p>
+          <a:p>
+            <a:pPr marL="969963" lvl="1" indent="-512763"/>
+            <a:r>
+              <a:rPr lang="th-TH" dirty="0">
+                <a:solidFill>
+                  <a:srgbClr val="3366FF"/>
+                </a:solidFill>
+              </a:rPr>
+              <a:t>ในหลักการอาจมี </a:t>
+            </a:r>
             <a:r>
               <a:rPr lang="en-US" dirty="0">
                 <a:solidFill>
                   <a:srgbClr val="3366FF"/>
                 </a:solidFill>
               </a:rPr>
-              <a:t>Platform specific models (PSM) </a:t>
-            </a:r>
-          </a:p>
-          <a:p>
-            <a:pPr marL="969963" lvl="1" indent="-512763"/>
-            <a:r>
-              <a:rPr lang="th-TH" dirty="0">
-                <a:solidFill>
-                  <a:srgbClr val="3366FF"/>
-                </a:solidFill>
-              </a:rPr>
-              <a:t>เป็นการดัดแปลงแบบจำลอง </a:t>
-            </a:r>
-            <a:r>
-              <a:rPr lang="en-US" dirty="0">
-                <a:solidFill>
-                  <a:srgbClr val="3366FF"/>
-                </a:solidFill>
-              </a:rPr>
-              <a:t>PIM </a:t>
-            </a:r>
-            <a:r>
-              <a:rPr lang="th-TH" dirty="0">
-                <a:solidFill>
-                  <a:srgbClr val="3366FF"/>
-                </a:solidFill>
-              </a:rPr>
-              <a:t>โดยมี </a:t>
-            </a:r>
-            <a:r>
-              <a:rPr lang="en-US" dirty="0">
-                <a:solidFill>
-                  <a:srgbClr val="3366FF"/>
-                </a:solidFill>
-              </a:rPr>
               <a:t>PSM </a:t>
             </a:r>
             <a:r>
@@ -20276,7 +20294,7 @@
                   <a:srgbClr val="3366FF"/>
                 </a:solidFill>
               </a:rPr>
-              <a:t>อิสระสำหรับแต่ละแพลตฟอร์มแอ</a:t>
+              <a:t>หลาย</a:t>
             </a:r>
             <a:r>
               <a:rPr lang="th-TH" dirty="0" err="1">
@@ -20284,15 +20302,15 @@
                   <a:srgbClr val="3366FF"/>
                 </a:solidFill>
               </a:rPr>
-              <a:t>็พ</a:t>
-            </a:r>
-            <a:r>
-              <a:rPr lang="th-TH" dirty="0">
-                <a:solidFill>
-                  <a:srgbClr val="3366FF"/>
-                </a:solidFill>
-              </a:rPr>
-              <a:t>พลิ</a:t>
+              <a:t>เลเย</a:t>
+            </a:r>
+            <a:r>
+              <a:rPr lang="th-TH" dirty="0">
+                <a:solidFill>
+                  <a:srgbClr val="3366FF"/>
+                </a:solidFill>
+              </a:rPr>
+              <a:t>อร</a:t>
             </a:r>
             <a:r>
               <a:rPr lang="th-TH" dirty="0" err="1">
@@ -20300,42 +20318,15 @@
                   <a:srgbClr val="3366FF"/>
                 </a:solidFill>
               </a:rPr>
-              <a:t>เค</a:t>
-            </a:r>
-            <a:r>
-              <a:rPr lang="th-TH" dirty="0">
-                <a:solidFill>
-                  <a:srgbClr val="3366FF"/>
-                </a:solidFill>
-              </a:rPr>
-              <a:t>ชัน </a:t>
-            </a:r>
-          </a:p>
-          <a:p>
-            <a:pPr marL="969963" lvl="1" indent="-512763"/>
-            <a:r>
-              <a:rPr lang="th-TH" dirty="0">
-                <a:solidFill>
-                  <a:srgbClr val="3366FF"/>
-                </a:solidFill>
-              </a:rPr>
-              <a:t>ในหลักการอาจมี </a:t>
-            </a:r>
-            <a:r>
-              <a:rPr lang="en-US" dirty="0">
-                <a:solidFill>
-                  <a:srgbClr val="3366FF"/>
-                </a:solidFill>
-              </a:rPr>
-              <a:t>PSM </a:t>
-            </a:r>
-            <a:r>
-              <a:rPr lang="th-TH" dirty="0">
-                <a:solidFill>
-                  <a:srgbClr val="3366FF"/>
-                </a:solidFill>
-              </a:rPr>
-              <a:t>หลาย</a:t>
+              <a:t>์ข</a:t>
+            </a:r>
+            <a:r>
+              <a:rPr lang="th-TH" dirty="0">
+                <a:solidFill>
+                  <a:srgbClr val="3366FF"/>
+                </a:solidFill>
+              </a:rPr>
+              <a:t>อง โดยแต่ละ</a:t>
             </a:r>
             <a:r>
               <a:rPr lang="th-TH" dirty="0" err="1">
@@ -20351,38 +20342,6 @@
                   <a:srgbClr val="3366FF"/>
                 </a:solidFill>
               </a:rPr>
-              <a:t>อร</a:t>
-            </a:r>
-            <a:r>
-              <a:rPr lang="th-TH" dirty="0" err="1">
-                <a:solidFill>
-                  <a:srgbClr val="3366FF"/>
-                </a:solidFill>
-              </a:rPr>
-              <a:t>์ข</a:t>
-            </a:r>
-            <a:r>
-              <a:rPr lang="th-TH" dirty="0">
-                <a:solidFill>
-                  <a:srgbClr val="3366FF"/>
-                </a:solidFill>
-              </a:rPr>
-              <a:t>อง โดยแต่ละ</a:t>
-            </a:r>
-            <a:r>
-              <a:rPr lang="th-TH" dirty="0" err="1">
-                <a:solidFill>
-                  <a:srgbClr val="3366FF"/>
-                </a:solidFill>
-              </a:rPr>
-              <a:t>เลเย</a:t>
-            </a:r>
-            <a:r>
-              <a:rPr lang="th-TH" dirty="0">
-                <a:solidFill>
-                  <a:srgbClr val="3366FF"/>
-                </a:solidFill>
-              </a:rPr>
               <a:t>อร์จะมีการอธิบายรายละเอียดเฉพาะของแพลตฟอร์มเอาไว้</a:t>
             </a:r>
           </a:p>
@@ -20411,7 +20370,7 @@
           <a:p>
             <a:r>
               <a:rPr lang="th-TH"/>
-              <a:t>2561.09.18</a:t>
+              <a:t>2562.09.20</a:t>
             </a:r>
             <a:endParaRPr lang="th-TH" dirty="0"/>
           </a:p>
@@ -20598,7 +20557,7 @@
           <a:p>
             <a:r>
               <a:rPr lang="th-TH"/>
-              <a:t>2561.09.18</a:t>
+              <a:t>2562.09.20</a:t>
             </a:r>
             <a:endParaRPr lang="th-TH" dirty="0"/>
           </a:p>
@@ -20785,7 +20744,7 @@
           <a:p>
             <a:r>
               <a:rPr lang="th-TH"/>
-              <a:t>2561.09.18</a:t>
+              <a:t>2562.09.20</a:t>
             </a:r>
             <a:endParaRPr lang="th-TH" dirty="0"/>
           </a:p>
@@ -21154,7 +21113,7 @@
           <a:p>
             <a:r>
               <a:rPr lang="th-TH"/>
-              <a:t>2561.09.18</a:t>
+              <a:t>2562.09.20</a:t>
             </a:r>
             <a:endParaRPr lang="th-TH" dirty="0"/>
           </a:p>
@@ -21460,7 +21419,7 @@
           <a:p>
             <a:r>
               <a:rPr lang="th-TH"/>
-              <a:t>2561.09.18</a:t>
+              <a:t>2562.09.20</a:t>
             </a:r>
             <a:endParaRPr lang="th-TH" dirty="0"/>
           </a:p>
@@ -21638,133 +21597,93 @@
                   <a:srgbClr val="CC0066"/>
                 </a:solidFill>
               </a:rPr>
-              <a:t>อย่างไรก็ตามนิยามที่เป็นประโยชน์สำหรับการอภิปรายอาจไม่ใช่นิยามที่เหมาะสม</a:t>
-            </a:r>
-            <a:r>
-              <a:rPr lang="th-TH">
+              <a:t>อย่างไรก็ตามนิยามที่เป็นประโยชน์สำหรับการอภิปรายอาจไม่ใช่นิยามที่เหมาะสมสำหรับการ</a:t>
+            </a:r>
+            <a:r>
+              <a:rPr lang="en-US" dirty="0">
                 <a:solidFill>
                   <a:srgbClr val="CC0066"/>
                 </a:solidFill>
               </a:rPr>
-              <a:t>สำหรับการ</a:t>
+              <a:t> implement </a:t>
+            </a:r>
+            <a:r>
+              <a:rPr lang="th-TH" dirty="0">
+                <a:solidFill>
+                  <a:srgbClr val="CC0066"/>
+                </a:solidFill>
+              </a:rPr>
+              <a:t>ซอฟต์แวร์</a:t>
+            </a:r>
+          </a:p>
+          <a:p>
+            <a:pPr marL="512763" indent="-512763"/>
+            <a:r>
+              <a:rPr lang="th-TH" dirty="0">
+                <a:solidFill>
+                  <a:srgbClr val="3366FF"/>
+                </a:solidFill>
+              </a:rPr>
+              <a:t>สำหรับระบบที่มีความซับซ้อนสูง การ </a:t>
             </a:r>
             <a:r>
               <a:rPr lang="en-US" dirty="0">
                 <a:solidFill>
+                  <a:srgbClr val="3366FF"/>
+                </a:solidFill>
+              </a:rPr>
+              <a:t>implement </a:t>
+            </a:r>
+            <a:r>
+              <a:rPr lang="th-TH" dirty="0">
+                <a:solidFill>
+                  <a:srgbClr val="3366FF"/>
+                </a:solidFill>
+              </a:rPr>
+              <a:t>ไม่ใช่ปัญหาหลัก </a:t>
+            </a:r>
+          </a:p>
+          <a:p>
+            <a:pPr marL="969963" lvl="1" indent="-512763"/>
+            <a:r>
+              <a:rPr lang="th-TH" dirty="0">
+                <a:solidFill>
                   <a:srgbClr val="CC0066"/>
                 </a:solidFill>
               </a:rPr>
-              <a:t> implement </a:t>
-            </a:r>
-            <a:r>
-              <a:rPr lang="th-TH" dirty="0">
+              <a:t>ปัญหาสำคัญมักเกิดกับ วิศวกรรมความต้องการ</a:t>
+            </a:r>
+            <a:r>
+              <a:rPr lang="en-US" dirty="0">
                 <a:solidFill>
                   <a:srgbClr val="CC0066"/>
                 </a:solidFill>
               </a:rPr>
-              <a:t>ซอฟต์แวร์</a:t>
-            </a:r>
-          </a:p>
-          <a:p>
-            <a:pPr marL="512763" indent="-512763"/>
-            <a:r>
-              <a:rPr lang="th-TH" dirty="0">
-                <a:solidFill>
-                  <a:srgbClr val="3366FF"/>
-                </a:solidFill>
-              </a:rPr>
-              <a:t>สำหรับระบบที่มีความซับซ้อนสูง </a:t>
-            </a:r>
-            <a:r>
-              <a:rPr lang="th-TH">
-                <a:solidFill>
-                  <a:srgbClr val="3366FF"/>
-                </a:solidFill>
-              </a:rPr>
-              <a:t>การ </a:t>
+              <a:t>, </a:t>
+            </a:r>
+            <a:r>
+              <a:rPr lang="th-TH" dirty="0">
+                <a:solidFill>
+                  <a:srgbClr val="CC0066"/>
+                </a:solidFill>
+              </a:rPr>
+              <a:t>ความปลอดภัยและเชื่อถือได้</a:t>
             </a:r>
             <a:r>
               <a:rPr lang="en-US" dirty="0">
                 <a:solidFill>
-                  <a:srgbClr val="3366FF"/>
-                </a:solidFill>
-              </a:rPr>
-              <a:t>implement </a:t>
-            </a:r>
-            <a:r>
-              <a:rPr lang="th-TH" dirty="0">
-                <a:solidFill>
-                  <a:srgbClr val="3366FF"/>
-                </a:solidFill>
-              </a:rPr>
-              <a:t>ไม่ใช่ปัญหาหลัก </a:t>
-            </a:r>
-          </a:p>
-          <a:p>
-            <a:pPr marL="969963" lvl="1" indent="-512763"/>
-            <a:r>
-              <a:rPr lang="th-TH" dirty="0">
-                <a:solidFill>
                   <a:srgbClr val="CC0066"/>
                 </a:solidFill>
               </a:rPr>
-              <a:t>ปัญหาสำคัญมักเกิดกับ วิศวกรรม</a:t>
-            </a:r>
-            <a:r>
-              <a:rPr lang="th-TH">
+              <a:t>, </a:t>
+            </a:r>
+            <a:r>
+              <a:rPr lang="th-TH" dirty="0">
                 <a:solidFill>
                   <a:srgbClr val="CC0066"/>
                 </a:solidFill>
               </a:rPr>
-              <a:t>ความต้องการ</a:t>
-            </a:r>
-            <a:r>
-              <a:rPr lang="en-US" dirty="0">
-                <a:solidFill>
-                  <a:srgbClr val="CC0066"/>
-                </a:solidFill>
-              </a:rPr>
-              <a:t>, </a:t>
-            </a:r>
-            <a:r>
-              <a:rPr lang="th-TH" dirty="0">
-                <a:solidFill>
-                  <a:srgbClr val="CC0066"/>
-                </a:solidFill>
-              </a:rPr>
-              <a:t>ความปลอดภัยแล</a:t>
-            </a:r>
-            <a:r>
-              <a:rPr lang="th-TH">
-                <a:solidFill>
-                  <a:srgbClr val="CC0066"/>
-                </a:solidFill>
-              </a:rPr>
-              <a:t>เชื่อถือได้</a:t>
-            </a:r>
-            <a:r>
-              <a:rPr lang="en-US" dirty="0">
-                <a:solidFill>
-                  <a:srgbClr val="CC0066"/>
-                </a:solidFill>
-              </a:rPr>
-              <a:t>, </a:t>
-            </a:r>
-            <a:r>
-              <a:rPr lang="th-TH" dirty="0">
-                <a:solidFill>
-                  <a:srgbClr val="CC0066"/>
-                </a:solidFill>
-              </a:rPr>
-              <a:t>การทำงานร่วมกับระบบที่มีอยู่เดิม จนถึงการทดสอบ</a:t>
-            </a:r>
-            <a:r>
-              <a:rPr lang="th-TH">
-                <a:solidFill>
-                  <a:srgbClr val="CC0066"/>
-                </a:solidFill>
-              </a:rPr>
-              <a:t>ระบบ </a:t>
+              <a:t>การทำงานร่วมกับระบบที่มีอยู่เดิม จนถึงการทดสอบระบบ </a:t>
             </a:r>
             <a:r>
               <a:rPr lang="en-US" dirty="0">
@@ -21805,7 +21724,7 @@
           <a:p>
             <a:r>
               <a:rPr lang="th-TH"/>
-              <a:t>2561.09.18</a:t>
+              <a:t>2562.09.20</a:t>
             </a:r>
             <a:endParaRPr lang="th-TH" dirty="0"/>
           </a:p>
@@ -21927,7 +21846,7 @@
                   <a:schemeClr val="accent1"/>
                 </a:solidFill>
               </a:rPr>
-              <a:t>Adoption of MDA</a:t>
+              <a:t>Key points</a:t>
             </a:r>
             <a:endParaRPr lang="th-TH" sz="6000" dirty="0">
               <a:solidFill>
@@ -21953,15 +21872,10 @@
             <p:ph idx="1"/>
           </p:nvPr>
         </p:nvSpPr>
-        <p:spPr>
-          <a:xfrm>
-            <a:off x="838200" y="1399868"/>
-            <a:ext cx="10515600" cy="4767263"/>
-          </a:xfrm>
-        </p:spPr>
+        <p:spPr/>
         <p:txBody>
           <a:bodyPr vert="horz" lIns="91440" tIns="45720" rIns="91440" bIns="45720" rtlCol="0">
-            <a:normAutofit/>
+            <a:normAutofit fontScale="85000" lnSpcReduction="20000"/>
           </a:bodyPr>
           <a:lstStyle/>
           <a:p>
@@ -21972,7 +21886,7 @@
                   <a:srgbClr val="3366FF"/>
                 </a:solidFill>
               </a:rPr>
-              <a:t>แบบจำลองเป็นเครื่องมือที่ดีในการอภิปรายเกี่ยวกับการออกแบบซอฟต์แวร์ </a:t>
+              <a:t>แบบจำลองคือมุมมองนามธรรมของระบบที่ละเว้นรายละเอียดของระบบ </a:t>
             </a:r>
           </a:p>
           <a:p>
@@ -21980,53 +21894,40 @@
             <a:r>
               <a:rPr lang="th-TH" dirty="0">
                 <a:solidFill>
-                  <a:srgbClr val="CC0066"/>
-                </a:solidFill>
-              </a:rPr>
-              <a:t>อย่างไรก็ตามนิยามที่เป็นประโยชน์สำหรับการอภิปรายอาจไม่ใช่นิยามที่เหมาะสม</a:t>
-            </a:r>
-            <a:r>
-              <a:rPr lang="th-TH">
-                <a:solidFill>
-                  <a:srgbClr val="CC0066"/>
-                </a:solidFill>
-              </a:rPr>
-              <a:t>สำหรับการ</a:t>
-            </a:r>
+                  <a:srgbClr val="3366FF"/>
+                </a:solidFill>
+              </a:rPr>
+              <a:t>สามารถเพิ่มเติมแบบจำลองย่อย ๆ เพื่อแสดง บริบท ปฏิสัมพันธ์ โครงสร้างและพฤติกรรม ของระบบ</a:t>
+            </a:r>
+          </a:p>
+          <a:p>
+            <a:pPr marL="512763" indent="-512763"/>
+            <a:r>
+              <a:rPr lang="th-TH" dirty="0">
+                <a:solidFill>
+                  <a:srgbClr val="3366FF"/>
+                </a:solidFill>
+              </a:rPr>
+              <a:t>แบบจำลองบริบทแสดงให้เห็นว่าระบบที่กำลังสร้าง อยู่ในสภาพแวดล้อมที่มีระบบและกระบวนการอื่น ๆ อย่างไร</a:t>
+            </a:r>
+          </a:p>
+          <a:p>
+            <a:pPr marL="512763" indent="-512763"/>
             <a:r>
               <a:rPr lang="en-US" dirty="0">
                 <a:solidFill>
-                  <a:srgbClr val="CC0066"/>
-                </a:solidFill>
-              </a:rPr>
-              <a:t> implement </a:t>
-            </a:r>
-            <a:r>
-              <a:rPr lang="th-TH" dirty="0">
-                <a:solidFill>
-                  <a:srgbClr val="CC0066"/>
-                </a:solidFill>
-              </a:rPr>
-              <a:t>ซอฟต์แวร์</a:t>
-            </a:r>
-          </a:p>
-          <a:p>
-            <a:pPr marL="512763" indent="-512763"/>
-            <a:r>
-              <a:rPr lang="th-TH" dirty="0">
-                <a:solidFill>
-                  <a:srgbClr val="3366FF"/>
-                </a:solidFill>
-              </a:rPr>
-              <a:t>สำหรับระบบที่มีความซับซ้อนสูง </a:t>
-            </a:r>
-            <a:r>
-              <a:rPr lang="th-TH">
-                <a:solidFill>
-                  <a:srgbClr val="3366FF"/>
-                </a:solidFill>
-              </a:rPr>
-              <a:t>การ </a:t>
+                  <a:srgbClr val="3366FF"/>
+                </a:solidFill>
+              </a:rPr>
+              <a:t>use case diagram </a:t>
+            </a:r>
+            <a:r>
+              <a:rPr lang="th-TH" dirty="0">
+                <a:solidFill>
+                  <a:srgbClr val="3366FF"/>
+                </a:solidFill>
+              </a:rPr>
+              <a:t>ใช้อธิบายปฏิสัมพันธ์ระหว่างระบบกับ </a:t>
             </a:r>
             <a:r>
               <a:rPr lang="en-US" dirty="0">
@@ -22034,97 +21935,63 @@
                   <a:srgbClr val="3366FF"/>
                 </a:solidFill>
               </a:rPr>
-              <a:t>implement </a:t>
-            </a:r>
-            <a:r>
-              <a:rPr lang="th-TH" dirty="0">
-                <a:solidFill>
-                  <a:srgbClr val="3366FF"/>
-                </a:solidFill>
-              </a:rPr>
-              <a:t>ไม่ใช่ปัญหาหลัก </a:t>
-            </a:r>
-          </a:p>
-          <a:p>
-            <a:pPr marL="969963" lvl="1" indent="-512763"/>
-            <a:r>
-              <a:rPr lang="th-TH" dirty="0">
-                <a:solidFill>
-                  <a:srgbClr val="CC0066"/>
-                </a:solidFill>
-              </a:rPr>
-              <a:t>ปัญหาสำคัญมักเกิดกับ วิศวกรรม</a:t>
-            </a:r>
-            <a:r>
-              <a:rPr lang="th-TH">
-                <a:solidFill>
-                  <a:srgbClr val="CC0066"/>
-                </a:solidFill>
-              </a:rPr>
-              <a:t>ความต้องการ</a:t>
-            </a:r>
-            <a:r>
-              <a:rPr lang="en-US" dirty="0">
-                <a:solidFill>
-                  <a:srgbClr val="CC0066"/>
-                </a:solidFill>
-              </a:rPr>
-              <a:t>, </a:t>
-            </a:r>
-            <a:r>
-              <a:rPr lang="th-TH" dirty="0">
-                <a:solidFill>
-                  <a:srgbClr val="CC0066"/>
-                </a:solidFill>
-              </a:rPr>
-              <a:t>ความปลอดภัยแล</a:t>
-            </a:r>
-            <a:r>
-              <a:rPr lang="th-TH">
-                <a:solidFill>
-                  <a:srgbClr val="CC0066"/>
-                </a:solidFill>
-              </a:rPr>
-              <a:t>เชื่อถือได้</a:t>
-            </a:r>
-            <a:r>
-              <a:rPr lang="en-US" dirty="0">
-                <a:solidFill>
-                  <a:srgbClr val="CC0066"/>
-                </a:solidFill>
-              </a:rPr>
-              <a:t>, </a:t>
-            </a:r>
-            <a:r>
-              <a:rPr lang="th-TH" dirty="0">
-                <a:solidFill>
-                  <a:srgbClr val="CC0066"/>
-                </a:solidFill>
-              </a:rPr>
-              <a:t>การทำงานร่วมกับระบบที่มีอยู่เดิม จนถึงการทดสอบ</a:t>
-            </a:r>
-            <a:r>
-              <a:rPr lang="th-TH">
-                <a:solidFill>
-                  <a:srgbClr val="CC0066"/>
-                </a:solidFill>
-              </a:rPr>
-              <a:t>ระบบ </a:t>
-            </a:r>
-            <a:r>
-              <a:rPr lang="en-US" dirty="0">
-                <a:solidFill>
-                  <a:srgbClr val="CC0066"/>
-                </a:solidFill>
-              </a:rPr>
-              <a:t> </a:t>
-            </a:r>
-            <a:endParaRPr lang="th-TH" dirty="0">
+              <a:t> actor </a:t>
+            </a:r>
+            <a:r>
+              <a:rPr lang="th-TH" dirty="0">
+                <a:solidFill>
+                  <a:srgbClr val="3366FF"/>
+                </a:solidFill>
+              </a:rPr>
+              <a:t>จากภายนอก </a:t>
+            </a:r>
+            <a:endParaRPr lang="en-US" dirty="0">
               <a:solidFill>
-                <a:srgbClr val="CC0066"/>
+                <a:srgbClr val="3366FF"/>
               </a:solidFill>
             </a:endParaRPr>
           </a:p>
+          <a:p>
+            <a:pPr marL="512763" indent="-512763"/>
+            <a:r>
+              <a:rPr lang="en-US" dirty="0">
+                <a:solidFill>
+                  <a:srgbClr val="3366FF"/>
+                </a:solidFill>
+              </a:rPr>
+              <a:t>Sequence diagram </a:t>
+            </a:r>
+            <a:r>
+              <a:rPr lang="th-TH" dirty="0">
+                <a:solidFill>
+                  <a:srgbClr val="3366FF"/>
+                </a:solidFill>
+              </a:rPr>
+              <a:t>เพิ่มรายละเอียดให้กับแบบจำลองปฏิสัมพันธ์ โดยการแสดงปฏิสัมพันธ์ระหว่างวัตถุในระบบ</a:t>
+            </a:r>
+          </a:p>
+          <a:p>
+            <a:pPr marL="512763" indent="-512763"/>
+            <a:r>
+              <a:rPr lang="th-TH" dirty="0">
+                <a:solidFill>
+                  <a:srgbClr val="3366FF"/>
+                </a:solidFill>
+              </a:rPr>
+              <a:t>แบบจำลองโครงสร้าง แสดงถึงองค์กรและสถาปัตยกรรมของระบบ </a:t>
+            </a:r>
+          </a:p>
+          <a:p>
+            <a:pPr marL="512763" indent="-512763"/>
+            <a:r>
+              <a:rPr lang="th-TH" dirty="0">
+                <a:solidFill>
+                  <a:srgbClr val="3366FF"/>
+                </a:solidFill>
+              </a:rPr>
+              <a:t>แผนภาพคลาสใช้ในการกำหนดโครงสร้างแบบคงที่ของคลาสในระบบและความสัมพันธ์ของระบบ</a:t>
+            </a:r>
+          </a:p>
         </p:txBody>
       </p:sp>
       <p:sp>
@@ -22150,7 +22017,7 @@
           <a:p>
             <a:r>
               <a:rPr lang="th-TH"/>
-              <a:t>2561.09.18</a:t>
+              <a:t>2562.09.20</a:t>
             </a:r>
             <a:endParaRPr lang="th-TH" dirty="0"/>
           </a:p>
@@ -22218,7 +22085,7 @@
     </p:spTree>
     <p:extLst>
       <p:ext uri="{BB962C8B-B14F-4D97-AF65-F5344CB8AC3E}">
-        <p14:creationId xmlns:p14="http://schemas.microsoft.com/office/powerpoint/2010/main" val="3464876773"/>
+        <p14:creationId xmlns:p14="http://schemas.microsoft.com/office/powerpoint/2010/main" val="2874678367"/>
       </p:ext>
     </p:extLst>
   </p:cSld>
@@ -22301,7 +22168,7 @@
         <p:spPr/>
         <p:txBody>
           <a:bodyPr vert="horz" lIns="91440" tIns="45720" rIns="91440" bIns="45720" rtlCol="0">
-            <a:normAutofit fontScale="85000" lnSpcReduction="20000"/>
+            <a:normAutofit fontScale="92500" lnSpcReduction="20000"/>
           </a:bodyPr>
           <a:lstStyle/>
           <a:p>
@@ -22312,7 +22179,39 @@
                   <a:srgbClr val="3366FF"/>
                 </a:solidFill>
               </a:rPr>
-              <a:t>แบบจำลองคือมุมมองนามธรรมของระบบที่ละเว้นรายละเอียดของระบบ </a:t>
+              <a:t>แบบจำลองพฤติกรรม ใช้เพื่ออธิบายพฤติกรรม</a:t>
+            </a:r>
+            <a:r>
+              <a:rPr lang="th-TH" dirty="0" err="1">
+                <a:solidFill>
+                  <a:srgbClr val="3366FF"/>
+                </a:solidFill>
+              </a:rPr>
+              <a:t>ได</a:t>
+            </a:r>
+            <a:r>
+              <a:rPr lang="th-TH" dirty="0">
+                <a:solidFill>
+                  <a:srgbClr val="3366FF"/>
+                </a:solidFill>
+              </a:rPr>
+              <a:t>นาม</a:t>
+            </a:r>
+            <a:r>
+              <a:rPr lang="th-TH" dirty="0" err="1">
+                <a:solidFill>
+                  <a:srgbClr val="3366FF"/>
+                </a:solidFill>
+              </a:rPr>
+              <a:t>ิก</a:t>
+            </a:r>
+            <a:r>
+              <a:rPr lang="th-TH" dirty="0">
+                <a:solidFill>
+                  <a:srgbClr val="3366FF"/>
+                </a:solidFill>
+              </a:rPr>
+              <a:t>ในขณะปฏิบัติการของระบบ </a:t>
             </a:r>
           </a:p>
           <a:p>
@@ -22320,80 +22219,66 @@
             <a:r>
               <a:rPr lang="th-TH" dirty="0">
                 <a:solidFill>
-                  <a:srgbClr val="3366FF"/>
-                </a:solidFill>
-              </a:rPr>
-              <a:t>สามารถเพิ่มเติมแบบจำลองย่อย ๆ เพื่อแสดง บริบท ปฏิสัมพันธ์ โครงสร้างและพฤติกรรม ของระบบ</a:t>
-            </a:r>
-          </a:p>
-          <a:p>
-            <a:pPr marL="512763" indent="-512763"/>
-            <a:r>
-              <a:rPr lang="th-TH" dirty="0">
-                <a:solidFill>
-                  <a:srgbClr val="3366FF"/>
-                </a:solidFill>
-              </a:rPr>
-              <a:t>แบบจำลองบริบทแสดงให้เห็นว่าระบบที่กำลังสร้าง อยู่ในสภาพแวดล้อมที่มีระบบและกระบวนการอื่น ๆ อย่างไร</a:t>
-            </a:r>
-          </a:p>
-          <a:p>
-            <a:pPr marL="512763" indent="-512763"/>
+                  <a:srgbClr val="CC0066"/>
+                </a:solidFill>
+              </a:rPr>
+              <a:t>เราสามารถจำลองจากมุมมองของข้อมูลที่ประมวลผลโดยระบบ (</a:t>
+            </a:r>
             <a:r>
               <a:rPr lang="en-US" dirty="0">
                 <a:solidFill>
-                  <a:srgbClr val="3366FF"/>
-                </a:solidFill>
-              </a:rPr>
-              <a:t>use case diagram </a:t>
-            </a:r>
-            <a:r>
-              <a:rPr lang="th-TH" dirty="0">
-                <a:solidFill>
-                  <a:srgbClr val="3366FF"/>
-                </a:solidFill>
-              </a:rPr>
-              <a:t>ใช้อธิบายปฏิสัมพันธ์ระหว่างระบบกับ </a:t>
+                  <a:srgbClr val="CC0066"/>
+                </a:solidFill>
+              </a:rPr>
+              <a:t>data-driven</a:t>
+            </a:r>
+            <a:r>
+              <a:rPr lang="th-TH" dirty="0">
+                <a:solidFill>
+                  <a:srgbClr val="CC0066"/>
+                </a:solidFill>
+              </a:rPr>
+              <a:t>)</a:t>
             </a:r>
             <a:r>
               <a:rPr lang="en-US" dirty="0">
                 <a:solidFill>
-                  <a:srgbClr val="3366FF"/>
-                </a:solidFill>
-              </a:rPr>
-              <a:t> actor </a:t>
-            </a:r>
-            <a:r>
-              <a:rPr lang="th-TH" dirty="0">
-                <a:solidFill>
-                  <a:srgbClr val="3366FF"/>
-                </a:solidFill>
-              </a:rPr>
-              <a:t>จากภายนอก </a:t>
-            </a:r>
-            <a:endParaRPr lang="en-US" dirty="0">
+                  <a:srgbClr val="CC0066"/>
+                </a:solidFill>
+              </a:rPr>
+              <a:t> </a:t>
+            </a:r>
+            <a:r>
+              <a:rPr lang="th-TH" dirty="0">
+                <a:solidFill>
+                  <a:srgbClr val="CC0066"/>
+                </a:solidFill>
+              </a:rPr>
+              <a:t>หรือโดยเหตุการณ์ที่กระตุ้นการตอบสนองจากระบบ</a:t>
+            </a:r>
+            <a:r>
+              <a:rPr lang="en-US" dirty="0">
+                <a:solidFill>
+                  <a:srgbClr val="CC0066"/>
+                </a:solidFill>
+              </a:rPr>
+              <a:t> (event driven)</a:t>
+            </a:r>
+            <a:endParaRPr lang="th-TH" dirty="0">
               <a:solidFill>
-                <a:srgbClr val="3366FF"/>
+                <a:srgbClr val="CC0066"/>
               </a:solidFill>
             </a:endParaRPr>
           </a:p>
           <a:p>
             <a:pPr marL="512763" indent="-512763"/>
             <a:r>
-              <a:rPr lang="en-US" dirty="0">
-                <a:solidFill>
-                  <a:srgbClr val="3366FF"/>
-                </a:solidFill>
-              </a:rPr>
-              <a:t>Sequence diagram </a:t>
-            </a:r>
-            <a:r>
-              <a:rPr lang="th-TH" dirty="0">
-                <a:solidFill>
-                  <a:srgbClr val="3366FF"/>
-                </a:solidFill>
-              </a:rPr>
-              <a:t>เพิ่มรายละเอียดให้กับแบบจำลองปฏิสัมพันธ์ โดยการแสดงปฏิสัมพันธ์ระหว่างวัตถุในระบบ</a:t>
+              <a:rPr lang="th-TH" dirty="0">
+                <a:solidFill>
+                  <a:srgbClr val="3366FF"/>
+                </a:solidFill>
+              </a:rPr>
+              <a:t>แผนภาพกิจกรรมสามารถใช้เพื่อจำลองการประมวลผลข้อมูลโดยที่แต่ละกิจกรรมจะแสดงถึงแต่ละขั้นตอนของกระบวนการ</a:t>
             </a:r>
           </a:p>
           <a:p>
@@ -22404,7 +22289,7 @@
                   <a:srgbClr val="3366FF"/>
                 </a:solidFill>
               </a:rPr>
-              <a:t>แบบจำลองโครงสร้าง แสดงถึงองค์กรและสถาปัตยกรรมของระบบ </a:t>
+              <a:t>แผนภาพสถานะใช้เพื่อจำลองพฤติกรรมของระบบเพื่อตอบสนองต่อเหตุการณ์ภายในหรือภายนอก</a:t>
             </a:r>
           </a:p>
           <a:p>
@@ -22415,7 +22300,7 @@
                   <a:srgbClr val="3366FF"/>
                 </a:solidFill>
               </a:rPr>
-              <a:t>แผนภาพคลาสใช้ในการกำหนดโครงสร้างแบบคงที่ของคลาสในระบบและความสัมพันธ์ของระบบ</a:t>
+              <a:t>วิศวกรรมแบบจำลองเป็นแนวทางใหม่ในการพัฒนาซอฟต์แวร์ ซึ่งระบบจะแสดงด้วยชุดของโมเดลที่สามารถแปลงเป็นรหัสที่ทำงานได้โดยอัตโนมัติ</a:t>
             </a:r>
           </a:p>
         </p:txBody>
@@ -22443,7 +22328,7 @@
           <a:p>
             <a:r>
               <a:rPr lang="th-TH"/>
-              <a:t>2561.09.18</a:t>
+              <a:t>2562.09.20</a:t>
             </a:r>
             <a:endParaRPr lang="th-TH" dirty="0"/>
           </a:p>
@@ -22511,7 +22396,7 @@
     </p:spTree>
     <p:extLst>
       <p:ext uri="{BB962C8B-B14F-4D97-AF65-F5344CB8AC3E}">
-        <p14:creationId xmlns:p14="http://schemas.microsoft.com/office/powerpoint/2010/main" val="2874678367"/>
+        <p14:creationId xmlns:p14="http://schemas.microsoft.com/office/powerpoint/2010/main" val="2983942971"/>
       </p:ext>
     </p:extLst>
   </p:cSld>
@@ -22543,7 +22428,7 @@
           <p:cNvPr id="2" name="ชื่อเรื่อง 1">
             <a:extLst>
               <a:ext uri="{FF2B5EF4-FFF2-40B4-BE49-F238E27FC236}">
-                <a16:creationId xmlns:a16="http://schemas.microsoft.com/office/drawing/2014/main" id="{2FEEAE3E-56A5-43A4-BD91-98E7967BBF66}"/>
+                <a16:creationId xmlns:a16="http://schemas.microsoft.com/office/drawing/2014/main" id="{B662D687-4352-406F-BCEC-9AB68C542954}"/>
               </a:ext>
             </a:extLst>
           </p:cNvPr>
@@ -22560,18 +22445,13 @@
           <a:lstStyle/>
           <a:p>
             <a:r>
-              <a:rPr lang="en-US" sz="6000" dirty="0">
+              <a:rPr lang="th-TH" dirty="0">
                 <a:solidFill>
                   <a:schemeClr val="accent1"/>
                 </a:solidFill>
               </a:rPr>
-              <a:t>Key points</a:t>
-            </a:r>
-            <a:endParaRPr lang="th-TH" sz="6000" dirty="0">
-              <a:solidFill>
-                <a:schemeClr val="accent1"/>
-              </a:solidFill>
-            </a:endParaRPr>
+              <a:t>คำถาม???</a:t>
+            </a:r>
           </a:p>
         </p:txBody>
       </p:sp>
@@ -22580,7 +22460,7 @@
           <p:cNvPr id="3" name="ตัวแทนเนื้อหา 2">
             <a:extLst>
               <a:ext uri="{FF2B5EF4-FFF2-40B4-BE49-F238E27FC236}">
-                <a16:creationId xmlns:a16="http://schemas.microsoft.com/office/drawing/2014/main" id="{76B58A90-976C-4938-91EC-C660548D0D2B}"/>
+                <a16:creationId xmlns:a16="http://schemas.microsoft.com/office/drawing/2014/main" id="{1102F606-46B2-491C-AE7F-BB01CB9CF8F2}"/>
               </a:ext>
             </a:extLst>
           </p:cNvPr>
@@ -22593,141 +22473,10 @@
         </p:nvSpPr>
         <p:spPr/>
         <p:txBody>
-          <a:bodyPr vert="horz" lIns="91440" tIns="45720" rIns="91440" bIns="45720" rtlCol="0">
-            <a:normAutofit fontScale="92500" lnSpcReduction="20000"/>
-          </a:bodyPr>
-          <a:lstStyle/>
-          <a:p>
-            <a:pPr marL="512763" indent="-512763"/>
-            <a:r>
-              <a:rPr lang="th-TH" dirty="0">
-                <a:solidFill>
-                  <a:srgbClr val="3366FF"/>
-                </a:solidFill>
-              </a:rPr>
-              <a:t>แบบจำลองพฤติกรรม ใช้เพื่ออธิบายพฤติกรรม</a:t>
-            </a:r>
-            <a:r>
-              <a:rPr lang="th-TH" dirty="0" err="1">
-                <a:solidFill>
-                  <a:srgbClr val="3366FF"/>
-                </a:solidFill>
-              </a:rPr>
-              <a:t>ได</a:t>
-            </a:r>
-            <a:r>
-              <a:rPr lang="th-TH" dirty="0">
-                <a:solidFill>
-                  <a:srgbClr val="3366FF"/>
-                </a:solidFill>
-              </a:rPr>
-              <a:t>นาม</a:t>
-            </a:r>
-            <a:r>
-              <a:rPr lang="th-TH" dirty="0" err="1">
-                <a:solidFill>
-                  <a:srgbClr val="3366FF"/>
-                </a:solidFill>
-              </a:rPr>
-              <a:t>ิกข</a:t>
-            </a:r>
-            <a:r>
-              <a:rPr lang="th-TH" dirty="0">
-                <a:solidFill>
-                  <a:srgbClr val="3366FF"/>
-                </a:solidFill>
-              </a:rPr>
-              <a:t>องในขณะปฏิบัติการของระบบ </a:t>
-            </a:r>
-          </a:p>
-          <a:p>
-            <a:pPr marL="969963" lvl="1" indent="-512763"/>
-            <a:r>
-              <a:rPr lang="th-TH" dirty="0">
-                <a:solidFill>
-                  <a:srgbClr val="CC0066"/>
-                </a:solidFill>
-              </a:rPr>
-              <a:t>เราสามารถจำลองจากมุมมองของข้อมูลที่ประมวลผลโดยระบบ (</a:t>
-            </a:r>
-            <a:r>
-              <a:rPr lang="en-US" dirty="0">
-                <a:solidFill>
-                  <a:srgbClr val="CC0066"/>
-                </a:solidFill>
-              </a:rPr>
-              <a:t>data-driven</a:t>
-            </a:r>
-            <a:r>
-              <a:rPr lang="th-TH" dirty="0">
-                <a:solidFill>
-                  <a:srgbClr val="CC0066"/>
-                </a:solidFill>
-              </a:rPr>
-              <a:t>)</a:t>
-            </a:r>
-            <a:r>
-              <a:rPr lang="en-US" dirty="0">
-                <a:solidFill>
-                  <a:srgbClr val="CC0066"/>
-                </a:solidFill>
-              </a:rPr>
-              <a:t> </a:t>
-            </a:r>
-            <a:r>
-              <a:rPr lang="th-TH" dirty="0">
-                <a:solidFill>
-                  <a:srgbClr val="CC0066"/>
-                </a:solidFill>
-              </a:rPr>
-              <a:t>หรือโดยเหตุการณ์ที่กระตุ้นการตอบสนองจากระบบ</a:t>
-            </a:r>
-            <a:r>
-              <a:rPr lang="en-US" dirty="0">
-                <a:solidFill>
-                  <a:srgbClr val="CC0066"/>
-                </a:solidFill>
-              </a:rPr>
-              <a:t> (event driven)</a:t>
-            </a:r>
-            <a:endParaRPr lang="th-TH" dirty="0">
-              <a:solidFill>
-                <a:srgbClr val="CC0066"/>
-              </a:solidFill>
-            </a:endParaRPr>
-          </a:p>
-          <a:p>
-            <a:pPr marL="512763" indent="-512763"/>
-            <a:r>
-              <a:rPr lang="th-TH" dirty="0">
-                <a:solidFill>
-                  <a:srgbClr val="3366FF"/>
-                </a:solidFill>
-              </a:rPr>
-              <a:t>แผนภาพกิจกรรมสามารถใช้เพื่อจำลองการประมวลผลข้อมูลโดยที่แต่ละกิจกรรมจะแสดงถึงแต่ละขั้นตอนของกระบวนการ</a:t>
-            </a:r>
-          </a:p>
-          <a:p>
-            <a:pPr marL="512763" indent="-512763"/>
-            <a:r>
-              <a:rPr lang="th-TH" dirty="0">
-                <a:solidFill>
-                  <a:srgbClr val="3366FF"/>
-                </a:solidFill>
-              </a:rPr>
-              <a:t>แผนภาพสถานะใช้เพื่อจำลองพฤติกรรมของระบบเพื่อตอบสนองต่อเหตุการณ์ภายในหรือภายนอก</a:t>
-            </a:r>
-          </a:p>
-          <a:p>
-            <a:pPr marL="512763" indent="-512763"/>
-            <a:r>
-              <a:rPr lang="th-TH" dirty="0">
-                <a:solidFill>
-                  <a:srgbClr val="3366FF"/>
-                </a:solidFill>
-              </a:rPr>
-              <a:t>วิศวกรรมแบบจำลองเป็นแนวทางใหม่ในการพัฒนาซอฟต์แวร์ ซึ่งระบบจะแสดงด้วยชุดของโมเดลที่สามารถแปลงเป็นรหัสที่ทำงานได้โดยอัตโนมัติ</a:t>
-            </a:r>
+          <a:bodyPr/>
+          <a:lstStyle/>
+          <a:p>
+            <a:endParaRPr lang="th-TH"/>
           </a:p>
         </p:txBody>
       </p:sp>
@@ -22736,7 +22485,7 @@
           <p:cNvPr id="4" name="ตัวแทนวันที่ 3">
             <a:extLst>
               <a:ext uri="{FF2B5EF4-FFF2-40B4-BE49-F238E27FC236}">
-                <a16:creationId xmlns:a16="http://schemas.microsoft.com/office/drawing/2014/main" id="{605B4A84-ABE9-435C-AB34-C7480A48DE2D}"/>
+                <a16:creationId xmlns:a16="http://schemas.microsoft.com/office/drawing/2014/main" id="{87A6BB5E-08F6-42AA-AB35-55E68D0ED785}"/>
               </a:ext>
             </a:extLst>
           </p:cNvPr>
@@ -22754,7 +22503,7 @@
           <a:p>
             <a:r>
               <a:rPr lang="th-TH"/>
-              <a:t>2561.09.18</a:t>
+              <a:t>2562.09.20</a:t>
             </a:r>
             <a:endParaRPr lang="th-TH" dirty="0"/>
           </a:p>
@@ -22765,7 +22514,7 @@
           <p:cNvPr id="5" name="ตัวแทนท้ายกระดาษ 4">
             <a:extLst>
               <a:ext uri="{FF2B5EF4-FFF2-40B4-BE49-F238E27FC236}">
-                <a16:creationId xmlns:a16="http://schemas.microsoft.com/office/drawing/2014/main" id="{961CE1D7-4CA5-47EC-B280-3C018FE58EC2}"/>
+                <a16:creationId xmlns:a16="http://schemas.microsoft.com/office/drawing/2014/main" id="{4B1071C7-B665-4683-BDF4-8887167FE1A0}"/>
               </a:ext>
             </a:extLst>
           </p:cNvPr>
@@ -22794,7 +22543,7 @@
           <p:cNvPr id="6" name="ตัวแทนหมายเลขสไลด์ 5">
             <a:extLst>
               <a:ext uri="{FF2B5EF4-FFF2-40B4-BE49-F238E27FC236}">
-                <a16:creationId xmlns:a16="http://schemas.microsoft.com/office/drawing/2014/main" id="{3A7F208C-82CC-4100-B926-CBC631B5D76D}"/>
+                <a16:creationId xmlns:a16="http://schemas.microsoft.com/office/drawing/2014/main" id="{FAAD111D-DAAB-434D-BD58-158C0504D6EF}"/>
               </a:ext>
             </a:extLst>
           </p:cNvPr>
@@ -22814,181 +22563,6 @@
               <a:rPr lang="th-TH" smtClean="0"/>
               <a:pPr/>
               <a:t>58</a:t>
-            </a:fld>
-            <a:endParaRPr lang="th-TH"/>
-          </a:p>
-        </p:txBody>
-      </p:sp>
-    </p:spTree>
-    <p:extLst>
-      <p:ext uri="{BB962C8B-B14F-4D97-AF65-F5344CB8AC3E}">
-        <p14:creationId xmlns:p14="http://schemas.microsoft.com/office/powerpoint/2010/main" val="2983942971"/>
-      </p:ext>
-    </p:extLst>
-  </p:cSld>
-  <p:clrMapOvr>
-    <a:masterClrMapping/>
-  </p:clrMapOvr>
-</p:sld>
-</file>
-
-<file path=ppt/slides/slide59.xml><?xml version="1.0" encoding="utf-8"?>
-<p:sld xmlns:a="http://schemas.openxmlformats.org/drawingml/2006/main" xmlns:r="http://schemas.openxmlformats.org/officeDocument/2006/relationships" xmlns:p="http://schemas.openxmlformats.org/presentationml/2006/main">
-  <p:cSld>
-    <p:spTree>
-      <p:nvGrpSpPr>
-        <p:cNvPr id="1" name=""/>
-        <p:cNvGrpSpPr/>
-        <p:nvPr/>
-      </p:nvGrpSpPr>
-      <p:grpSpPr>
-        <a:xfrm>
-          <a:off x="0" y="0"/>
-          <a:ext cx="0" cy="0"/>
-          <a:chOff x="0" y="0"/>
-          <a:chExt cx="0" cy="0"/>
-        </a:xfrm>
-      </p:grpSpPr>
-      <p:sp>
-        <p:nvSpPr>
-          <p:cNvPr id="2" name="ชื่อเรื่อง 1">
-            <a:extLst>
-              <a:ext uri="{FF2B5EF4-FFF2-40B4-BE49-F238E27FC236}">
-                <a16:creationId xmlns:a16="http://schemas.microsoft.com/office/drawing/2014/main" id="{B662D687-4352-406F-BCEC-9AB68C542954}"/>
-              </a:ext>
-            </a:extLst>
-          </p:cNvPr>
-          <p:cNvSpPr>
-            <a:spLocks noGrp="1"/>
-          </p:cNvSpPr>
-          <p:nvPr>
-            <p:ph type="title"/>
-          </p:nvPr>
-        </p:nvSpPr>
-        <p:spPr/>
-        <p:txBody>
-          <a:bodyPr/>
-          <a:lstStyle/>
-          <a:p>
-            <a:r>
-              <a:rPr lang="th-TH" dirty="0">
-                <a:solidFill>
-                  <a:schemeClr val="accent1"/>
-                </a:solidFill>
-              </a:rPr>
-              <a:t>คำถาม???</a:t>
-            </a:r>
-          </a:p>
-        </p:txBody>
-      </p:sp>
-      <p:sp>
-        <p:nvSpPr>
-          <p:cNvPr id="3" name="ตัวแทนเนื้อหา 2">
-            <a:extLst>
-              <a:ext uri="{FF2B5EF4-FFF2-40B4-BE49-F238E27FC236}">
-                <a16:creationId xmlns:a16="http://schemas.microsoft.com/office/drawing/2014/main" id="{1102F606-46B2-491C-AE7F-BB01CB9CF8F2}"/>
-              </a:ext>
-            </a:extLst>
-          </p:cNvPr>
-          <p:cNvSpPr>
-            <a:spLocks noGrp="1"/>
-          </p:cNvSpPr>
-          <p:nvPr>
-            <p:ph idx="1"/>
-          </p:nvPr>
-        </p:nvSpPr>
-        <p:spPr/>
-        <p:txBody>
-          <a:bodyPr/>
-          <a:lstStyle/>
-          <a:p>
-            <a:endParaRPr lang="th-TH"/>
-          </a:p>
-        </p:txBody>
-      </p:sp>
-      <p:sp>
-        <p:nvSpPr>
-          <p:cNvPr id="4" name="ตัวแทนวันที่ 3">
-            <a:extLst>
-              <a:ext uri="{FF2B5EF4-FFF2-40B4-BE49-F238E27FC236}">
-                <a16:creationId xmlns:a16="http://schemas.microsoft.com/office/drawing/2014/main" id="{87A6BB5E-08F6-42AA-AB35-55E68D0ED785}"/>
-              </a:ext>
-            </a:extLst>
-          </p:cNvPr>
-          <p:cNvSpPr>
-            <a:spLocks noGrp="1"/>
-          </p:cNvSpPr>
-          <p:nvPr>
-            <p:ph type="dt" sz="half" idx="10"/>
-          </p:nvPr>
-        </p:nvSpPr>
-        <p:spPr/>
-        <p:txBody>
-          <a:bodyPr/>
-          <a:lstStyle/>
-          <a:p>
-            <a:r>
-              <a:rPr lang="th-TH"/>
-              <a:t>2561.09.18</a:t>
-            </a:r>
-            <a:endParaRPr lang="th-TH" dirty="0"/>
-          </a:p>
-        </p:txBody>
-      </p:sp>
-      <p:sp>
-        <p:nvSpPr>
-          <p:cNvPr id="5" name="ตัวแทนท้ายกระดาษ 4">
-            <a:extLst>
-              <a:ext uri="{FF2B5EF4-FFF2-40B4-BE49-F238E27FC236}">
-                <a16:creationId xmlns:a16="http://schemas.microsoft.com/office/drawing/2014/main" id="{4B1071C7-B665-4683-BDF4-8887167FE1A0}"/>
-              </a:ext>
-            </a:extLst>
-          </p:cNvPr>
-          <p:cNvSpPr>
-            <a:spLocks noGrp="1"/>
-          </p:cNvSpPr>
-          <p:nvPr>
-            <p:ph type="ftr" sz="quarter" idx="11"/>
-          </p:nvPr>
-        </p:nvSpPr>
-        <p:spPr/>
-        <p:txBody>
-          <a:bodyPr/>
-          <a:lstStyle/>
-          <a:p>
-            <a:r>
-              <a:rPr lang="en-US"/>
-              <a:t>Week 06 System Modeling</a:t>
-            </a:r>
-            <a:endParaRPr lang="th-TH" dirty="0"/>
-          </a:p>
-        </p:txBody>
-      </p:sp>
-      <p:sp>
-        <p:nvSpPr>
-          <p:cNvPr id="6" name="ตัวแทนหมายเลขสไลด์ 5">
-            <a:extLst>
-              <a:ext uri="{FF2B5EF4-FFF2-40B4-BE49-F238E27FC236}">
-                <a16:creationId xmlns:a16="http://schemas.microsoft.com/office/drawing/2014/main" id="{FAAD111D-DAAB-434D-BD58-158C0504D6EF}"/>
-              </a:ext>
-            </a:extLst>
-          </p:cNvPr>
-          <p:cNvSpPr>
-            <a:spLocks noGrp="1"/>
-          </p:cNvSpPr>
-          <p:nvPr>
-            <p:ph type="sldNum" sz="quarter" idx="12"/>
-          </p:nvPr>
-        </p:nvSpPr>
-        <p:spPr/>
-        <p:txBody>
-          <a:bodyPr/>
-          <a:lstStyle/>
-          <a:p>
-            <a:fld id="{5D639AA3-5093-4478-A661-E12EC870A0F9}" type="slidenum">
-              <a:rPr lang="th-TH" smtClean="0"/>
-              <a:pPr/>
-              <a:t>59</a:t>
             </a:fld>
             <a:endParaRPr lang="th-TH"/>
           </a:p>
@@ -23400,7 +22974,7 @@
           <a:p>
             <a:r>
               <a:rPr lang="th-TH"/>
-              <a:t>2561.09.18</a:t>
+              <a:t>2562.09.20</a:t>
             </a:r>
             <a:endParaRPr lang="th-TH" dirty="0"/>
           </a:p>
@@ -23651,7 +23225,7 @@
                   <a:srgbClr val="3366FF"/>
                 </a:solidFill>
               </a:rPr>
-              <a:t>ช่วยจดทำหรือจัดการเอกสารเกี่ยวกับระบบที่มีอยู่</a:t>
+              <a:t>ช่วยจดจำหรือจัดการเอกสารเกี่ยวกับระบบที่มีอยู่</a:t>
             </a:r>
           </a:p>
           <a:p>
@@ -23711,9 +23285,10 @@
           <a:lstStyle/>
           <a:p>
             <a:r>
-              <a:rPr lang="th-TH" dirty="0"/>
-              <a:t>2561.09.18</a:t>
-            </a:r>
+              <a:rPr lang="th-TH"/>
+              <a:t>2562.09.20</a:t>
+            </a:r>
+            <a:endParaRPr lang="th-TH" dirty="0"/>
           </a:p>
         </p:txBody>
       </p:sp>
@@ -23917,7 +23492,7 @@
                 <a:latin typeface="TH Baijam" panose="02000506000000020004" pitchFamily="2" charset="-34"/>
                 <a:cs typeface="TH Baijam" panose="02000506000000020004" pitchFamily="2" charset="-34"/>
               </a:rPr>
-              <a:t>2561.09.18</a:t>
+              <a:t>2562.09.20</a:t>
             </a:r>
             <a:endParaRPr lang="th-TH" sz="1800" b="1" dirty="0">
               <a:solidFill>
@@ -24226,7 +23801,7 @@
           <a:p>
             <a:r>
               <a:rPr lang="th-TH"/>
-              <a:t>2561.09.18</a:t>
+              <a:t>2562.09.20</a:t>
             </a:r>
             <a:endParaRPr lang="th-TH" dirty="0"/>
           </a:p>

</xml_diff>